<commit_message>
Made some more changes.
</commit_message>
<xml_diff>
--- a/fancy/openPayment - Original Draft.pptx
+++ b/fancy/openPayment - Original Draft.pptx
@@ -5299,8 +5299,13 @@
             </a:pPr>
             <a:r>
               <a:rPr lang="en-US" dirty="0" smtClean="0"/>
-              <a:t>Stolen credit card data can lead to financial loss, identity theft and other criminal activity</a:t>
-            </a:r>
+              <a:t>Stolen credit card data can lead to financial loss, identity theft and other criminal </a:t>
+            </a:r>
+            <a:r>
+              <a:rPr lang="en-US" dirty="0" smtClean="0"/>
+              <a:t>activity.</a:t>
+            </a:r>
+            <a:endParaRPr lang="en-US" dirty="0" smtClean="0"/>
           </a:p>
           <a:p>
             <a:pPr>
@@ -5737,13 +5742,21 @@
         </p:spPr>
         <p:txBody>
           <a:bodyPr>
-            <a:normAutofit fontScale="85000" lnSpcReduction="10000"/>
+            <a:normAutofit fontScale="92500" lnSpcReduction="20000"/>
           </a:bodyPr>
           <a:lstStyle/>
           <a:p>
             <a:r>
               <a:rPr lang="en-US" dirty="0" smtClean="0"/>
-              <a:t>The solution is to use digital Tokens as a method to perform transactions.</a:t>
+              <a:t>The solution is to use digital </a:t>
+            </a:r>
+            <a:r>
+              <a:rPr lang="en-US" dirty="0" smtClean="0"/>
+              <a:t>tokens </a:t>
+            </a:r>
+            <a:r>
+              <a:rPr lang="en-US" dirty="0" smtClean="0"/>
+              <a:t>as a method to perform transactions.</a:t>
             </a:r>
           </a:p>
           <a:p>
@@ -5753,7 +5766,15 @@
             </a:r>
             <a:r>
               <a:rPr lang="en-US" dirty="0" smtClean="0"/>
-              <a:t>sing tokens:</a:t>
+              <a:t>sing </a:t>
+            </a:r>
+            <a:r>
+              <a:rPr lang="en-US" dirty="0" smtClean="0"/>
+              <a:t>digital tokens</a:t>
+            </a:r>
+            <a:r>
+              <a:rPr lang="en-US" dirty="0" smtClean="0"/>
+              <a:t>:</a:t>
             </a:r>
           </a:p>
           <a:p>
@@ -5779,7 +5800,27 @@
           <a:p>
             <a:r>
               <a:rPr lang="en-US" dirty="0" smtClean="0"/>
-              <a:t>Others companies are working on this problem, including a proposed global standard by </a:t>
+              <a:t>Others </a:t>
+            </a:r>
+            <a:r>
+              <a:rPr lang="en-US" dirty="0" smtClean="0"/>
+              <a:t>are </a:t>
+            </a:r>
+            <a:r>
+              <a:rPr lang="en-US" dirty="0" smtClean="0"/>
+              <a:t>working on this problem, including a proposed global </a:t>
+            </a:r>
+            <a:r>
+              <a:rPr lang="en-US" dirty="0"/>
+              <a:t>digital </a:t>
+            </a:r>
+            <a:r>
+              <a:rPr lang="en-US" dirty="0" smtClean="0"/>
+              <a:t>token standard </a:t>
+            </a:r>
+            <a:r>
+              <a:rPr lang="en-US" dirty="0" smtClean="0"/>
+              <a:t>by </a:t>
             </a:r>
             <a:r>
               <a:rPr lang="en-US" dirty="0"/>
@@ -5793,15 +5834,7 @@
           <a:p>
             <a:r>
               <a:rPr lang="en-US" dirty="0" smtClean="0"/>
-              <a:t>A large concern is that existing efforts will not go far enough in protecting a user’s PII data and the standard would be controlled </a:t>
-            </a:r>
-            <a:r>
-              <a:rPr lang="en-US" smtClean="0"/>
-              <a:t>by larger </a:t>
-            </a:r>
-            <a:r>
-              <a:rPr lang="en-US" dirty="0" smtClean="0"/>
-              <a:t>players in the market. </a:t>
+              <a:t>A large concern is that existing efforts will not go far enough in protecting a user’s PII data and the standard would be controlled by larger players in the market. </a:t>
             </a:r>
             <a:endParaRPr lang="en-US" dirty="0"/>
           </a:p>
@@ -6233,7 +6266,7 @@
         </p:spPr>
         <p:txBody>
           <a:bodyPr>
-            <a:normAutofit/>
+            <a:normAutofit fontScale="92500"/>
           </a:bodyPr>
           <a:lstStyle/>
           <a:p>
@@ -6241,18 +6274,29 @@
               <a:buNone/>
             </a:pPr>
             <a:r>
-              <a:rPr lang="en-US" sz="2400" dirty="0" err="1" smtClean="0"/>
+              <a:rPr lang="en-US" sz="2400" b="1" dirty="0" err="1" smtClean="0"/>
               <a:t>openPayment</a:t>
             </a:r>
             <a:r>
-              <a:rPr lang="en-US" sz="2400" dirty="0" smtClean="0"/>
-              <a:t> is a Token payment standard that </a:t>
-            </a:r>
-            <a:r>
-              <a:rPr lang="en-US" sz="2400" dirty="0" smtClean="0"/>
-              <a:t>is currently being developed by a consortium of individuals and companies.</a:t>
-            </a:r>
-            <a:endParaRPr lang="en-US" sz="2400" dirty="0" smtClean="0"/>
+              <a:rPr lang="en-US" sz="2400" b="1" dirty="0" smtClean="0"/>
+              <a:t> is </a:t>
+            </a:r>
+            <a:r>
+              <a:rPr lang="en-US" sz="2400" b="1" dirty="0" smtClean="0"/>
+              <a:t>an digital token </a:t>
+            </a:r>
+            <a:r>
+              <a:rPr lang="en-US" sz="2400" b="1" dirty="0" smtClean="0"/>
+              <a:t>payment </a:t>
+            </a:r>
+            <a:r>
+              <a:rPr lang="en-US" sz="2400" b="1" dirty="0" smtClean="0"/>
+              <a:t>open standard </a:t>
+            </a:r>
+            <a:r>
+              <a:rPr lang="en-US" sz="2400" b="1" dirty="0" smtClean="0"/>
+              <a:t>that is currently being developed by a consortium of individuals and companies.</a:t>
+            </a:r>
           </a:p>
         </p:txBody>
       </p:sp>
@@ -6588,7 +6632,7 @@
           <p:nvPr>
             <p:extLst>
               <p:ext uri="{D42A27DB-BD31-4B8C-83A1-F6EECF244321}">
-                <p14:modId xmlns:p14="http://schemas.microsoft.com/office/powerpoint/2010/main" val="2280838247"/>
+                <p14:modId xmlns:p14="http://schemas.microsoft.com/office/powerpoint/2010/main" val="3406197004"/>
               </p:ext>
             </p:extLst>
           </p:nvPr>
@@ -6649,8 +6693,13 @@
                       </a:pPr>
                       <a:r>
                         <a:rPr lang="en-US" dirty="0" smtClean="0"/>
-                        <a:t>Protect a user’s PII data at all costs</a:t>
+                        <a:t>Protect a user’s PII data at all </a:t>
                       </a:r>
+                      <a:r>
+                        <a:rPr lang="en-US" dirty="0" smtClean="0"/>
+                        <a:t>costs.</a:t>
+                      </a:r>
+                      <a:endParaRPr lang="en-US" dirty="0" smtClean="0"/>
                     </a:p>
                     <a:p>
                       <a:pPr marL="742950" lvl="1" indent="-285750">
@@ -6662,8 +6711,13 @@
                       </a:pPr>
                       <a:r>
                         <a:rPr lang="en-US" dirty="0" smtClean="0"/>
-                        <a:t>Facilitate consumer financial transactions using digital tokens (both online and offline)</a:t>
+                        <a:t>Facilitate consumer financial transactions using digital tokens (both online and offline</a:t>
                       </a:r>
+                      <a:r>
+                        <a:rPr lang="en-US" dirty="0" smtClean="0"/>
+                        <a:t>).</a:t>
+                      </a:r>
+                      <a:endParaRPr lang="en-US" dirty="0" smtClean="0"/>
                     </a:p>
                     <a:p>
                       <a:pPr marL="742950" lvl="1" indent="-285750">
@@ -6680,6 +6734,10 @@
                       <a:r>
                         <a:rPr lang="en-US" dirty="0" err="1" smtClean="0"/>
                         <a:t>openPayment</a:t>
+                      </a:r>
+                      <a:r>
+                        <a:rPr lang="en-US" smtClean="0"/>
+                        <a:t>.</a:t>
                       </a:r>
                       <a:endParaRPr lang="en-US" dirty="0" smtClean="0"/>
                     </a:p>

</xml_diff>